<commit_message>
ppt updated with comments from Prof Ricardo
</commit_message>
<xml_diff>
--- a/MockUpShiny.pptx
+++ b/MockUpShiny.pptx
@@ -7,6 +7,7 @@
   <p:sldIdLst>
     <p:sldId id="269" r:id="rId2"/>
     <p:sldId id="270" r:id="rId3"/>
+    <p:sldId id="271" r:id="rId4"/>
   </p:sldIdLst>
   <p:sldSz cx="12192000" cy="6858000"/>
   <p:notesSz cx="7023100" cy="9309100"/>
@@ -122,7 +123,48 @@
       </p:ext>
     </p:extLst>
   </p:cmAuthor>
+  <p:cmAuthor id="2" name="Joana Gomes Dias" initials="JGD" lastIdx="3" clrIdx="1">
+    <p:extLst>
+      <p:ext uri="{19B8F6BF-5375-455C-9EA6-DF929625EA0E}">
+        <p15:presenceInfo xmlns:p15="http://schemas.microsoft.com/office/powerpoint/2012/main" userId="S::Joana.Gomes.Dias@ecdc.europa.eu::27787252-7159-4e20-a66e-3bccd04b376a" providerId="AD"/>
+      </p:ext>
+    </p:extLst>
+  </p:cmAuthor>
 </p:cmAuthorLst>
+</file>
+
+<file path=ppt/comments/comment1.xml><?xml version="1.0" encoding="utf-8"?>
+<p:cmLst xmlns:a="http://schemas.openxmlformats.org/drawingml/2006/main" xmlns:r="http://schemas.openxmlformats.org/officeDocument/2006/relationships" xmlns:p="http://schemas.openxmlformats.org/presentationml/2006/main">
+  <p:cm authorId="2" dt="2022-03-21T20:00:55.823" idx="1">
+    <p:pos x="871" y="2753"/>
+    <p:text>multiple choice</p:text>
+    <p:extLst>
+      <p:ext uri="{C676402C-5697-4E1C-873F-D02D1690AC5C}">
+        <p15:threadingInfo xmlns:p15="http://schemas.microsoft.com/office/powerpoint/2012/main" timeZoneBias="-60"/>
+      </p:ext>
+    </p:extLst>
+  </p:cm>
+  <p:cm authorId="2" dt="2022-03-21T20:01:21.863" idx="2">
+    <p:pos x="3424" y="3216"/>
+    <p:text>links para analises especificas - sugestoes para visitar</p:text>
+    <p:extLst>
+      <p:ext uri="{C676402C-5697-4E1C-873F-D02D1690AC5C}">
+        <p15:threadingInfo xmlns:p15="http://schemas.microsoft.com/office/powerpoint/2012/main" timeZoneBias="-60"/>
+      </p:ext>
+    </p:extLst>
+  </p:cm>
+  <p:cm authorId="2" dt="2022-03-21T20:02:26.463" idx="3">
+    <p:pos x="3424" y="3352"/>
+    <p:text>run for a pre defined set of parameters</p:text>
+    <p:extLst>
+      <p:ext uri="{C676402C-5697-4E1C-873F-D02D1690AC5C}">
+        <p15:threadingInfo xmlns:p15="http://schemas.microsoft.com/office/powerpoint/2012/main" timeZoneBias="-60">
+          <p15:parentCm authorId="2" idx="2"/>
+        </p15:threadingInfo>
+      </p:ext>
+    </p:extLst>
+  </p:cm>
+</p:cmLst>
 </file>
 
 <file path=ppt/slideLayouts/slideLayout1.xml><?xml version="1.0" encoding="utf-8"?>
@@ -3713,7 +3755,7 @@
                 <a:ea typeface="Tahoma" panose="020B0604030504040204" pitchFamily="34" charset="0"/>
                 <a:cs typeface="Tahoma" panose="020B0604030504040204" pitchFamily="34" charset="0"/>
               </a:rPr>
-              <a:t>20xx-01-01</a:t>
+              <a:t>20xx</a:t>
             </a:r>
           </a:p>
         </p:txBody>
@@ -3784,7 +3826,7 @@
                 <a:ea typeface="Tahoma" panose="020B0604030504040204" pitchFamily="34" charset="0"/>
                 <a:cs typeface="Tahoma" panose="020B0604030504040204" pitchFamily="34" charset="0"/>
               </a:rPr>
-              <a:t>20xx-12-31</a:t>
+              <a:t>20xx</a:t>
             </a:r>
           </a:p>
         </p:txBody>
@@ -5120,6 +5162,187 @@
 </p:sld>
 </file>
 
+<file path=ppt/slides/slide3.xml><?xml version="1.0" encoding="utf-8"?>
+<p:sld xmlns:a="http://schemas.openxmlformats.org/drawingml/2006/main" xmlns:r="http://schemas.openxmlformats.org/officeDocument/2006/relationships" xmlns:p="http://schemas.openxmlformats.org/presentationml/2006/main">
+  <p:cSld>
+    <p:spTree>
+      <p:nvGrpSpPr>
+        <p:cNvPr id="1" name=""/>
+        <p:cNvGrpSpPr/>
+        <p:nvPr/>
+      </p:nvGrpSpPr>
+      <p:grpSpPr>
+        <a:xfrm>
+          <a:off x="0" y="0"/>
+          <a:ext cx="0" cy="0"/>
+          <a:chOff x="0" y="0"/>
+          <a:chExt cx="0" cy="0"/>
+        </a:xfrm>
+      </p:grpSpPr>
+      <p:sp>
+        <p:nvSpPr>
+          <p:cNvPr id="2" name="TextBox 1">
+            <a:extLst>
+              <a:ext uri="{FF2B5EF4-FFF2-40B4-BE49-F238E27FC236}">
+                <a16:creationId xmlns:a16="http://schemas.microsoft.com/office/drawing/2014/main" id="{C5FF59EC-710C-491F-AF7B-5B3B97EA79F1}"/>
+              </a:ext>
+            </a:extLst>
+          </p:cNvPr>
+          <p:cNvSpPr txBox="1"/>
+          <p:nvPr/>
+        </p:nvSpPr>
+        <p:spPr>
+          <a:xfrm>
+            <a:off x="2037806" y="644434"/>
+            <a:ext cx="4911634" cy="369332"/>
+          </a:xfrm>
+          <a:prstGeom prst="rect">
+            <a:avLst/>
+          </a:prstGeom>
+          <a:noFill/>
+        </p:spPr>
+        <p:txBody>
+          <a:bodyPr wrap="square" rtlCol="0">
+            <a:spAutoFit/>
+          </a:bodyPr>
+          <a:lstStyle/>
+          <a:p>
+            <a:r>
+              <a:rPr lang="en-GB" dirty="0"/>
+              <a:t>Proof of concept using PT as case-study</a:t>
+            </a:r>
+          </a:p>
+        </p:txBody>
+      </p:sp>
+      <p:sp>
+        <p:nvSpPr>
+          <p:cNvPr id="3" name="TextBox 2">
+            <a:extLst>
+              <a:ext uri="{FF2B5EF4-FFF2-40B4-BE49-F238E27FC236}">
+                <a16:creationId xmlns:a16="http://schemas.microsoft.com/office/drawing/2014/main" id="{01A89826-CB33-426B-BBB2-BDFA40E58170}"/>
+              </a:ext>
+            </a:extLst>
+          </p:cNvPr>
+          <p:cNvSpPr txBox="1"/>
+          <p:nvPr/>
+        </p:nvSpPr>
+        <p:spPr>
+          <a:xfrm>
+            <a:off x="2037806" y="1114696"/>
+            <a:ext cx="3866605" cy="1477328"/>
+          </a:xfrm>
+          <a:prstGeom prst="rect">
+            <a:avLst/>
+          </a:prstGeom>
+          <a:noFill/>
+        </p:spPr>
+        <p:txBody>
+          <a:bodyPr wrap="square" rtlCol="0">
+            <a:spAutoFit/>
+          </a:bodyPr>
+          <a:lstStyle/>
+          <a:p>
+            <a:r>
+              <a:rPr lang="en-GB" dirty="0" err="1"/>
+              <a:t>Custo</a:t>
+            </a:r>
+            <a:r>
+              <a:rPr lang="en-GB" dirty="0"/>
+              <a:t> – </a:t>
+            </a:r>
+            <a:r>
+              <a:rPr lang="en-GB" dirty="0" err="1"/>
+              <a:t>mto</a:t>
+            </a:r>
+            <a:r>
+              <a:rPr lang="en-GB" dirty="0"/>
+              <a:t> </a:t>
+            </a:r>
+            <a:r>
+              <a:rPr lang="en-GB" dirty="0" err="1"/>
+              <a:t>bom</a:t>
+            </a:r>
+            <a:r>
+              <a:rPr lang="en-GB" dirty="0"/>
+              <a:t> </a:t>
+            </a:r>
+            <a:r>
+              <a:rPr lang="en-GB" dirty="0" err="1"/>
+              <a:t>estudo</a:t>
+            </a:r>
+            <a:r>
+              <a:rPr lang="en-GB" dirty="0"/>
+              <a:t>/</a:t>
+            </a:r>
+            <a:r>
+              <a:rPr lang="en-GB" dirty="0" err="1"/>
+              <a:t>contactar</a:t>
+            </a:r>
+            <a:r>
+              <a:rPr lang="en-GB" dirty="0"/>
+              <a:t> </a:t>
+            </a:r>
+            <a:r>
+              <a:rPr lang="en-GB" dirty="0" err="1"/>
+              <a:t>alguem</a:t>
+            </a:r>
+            <a:r>
+              <a:rPr lang="en-GB" dirty="0"/>
+              <a:t> de um </a:t>
+            </a:r>
+            <a:r>
+              <a:rPr lang="en-GB" dirty="0" err="1"/>
+              <a:t>hosp</a:t>
+            </a:r>
+            <a:endParaRPr lang="en-GB" dirty="0"/>
+          </a:p>
+          <a:p>
+            <a:endParaRPr lang="en-GB" dirty="0"/>
+          </a:p>
+          <a:p>
+            <a:r>
+              <a:rPr lang="en-GB" dirty="0" err="1"/>
+              <a:t>Custo</a:t>
+            </a:r>
+            <a:r>
+              <a:rPr lang="en-GB" dirty="0"/>
+              <a:t> de </a:t>
+            </a:r>
+            <a:r>
+              <a:rPr lang="en-GB" dirty="0" err="1"/>
+              <a:t>nao</a:t>
+            </a:r>
+            <a:r>
+              <a:rPr lang="en-GB" dirty="0"/>
+              <a:t> se </a:t>
+            </a:r>
+            <a:r>
+              <a:rPr lang="en-GB" dirty="0" err="1"/>
+              <a:t>ter</a:t>
+            </a:r>
+            <a:r>
+              <a:rPr lang="en-GB" dirty="0"/>
+              <a:t> dados</a:t>
+            </a:r>
+          </a:p>
+          <a:p>
+            <a:endParaRPr lang="en-GB" dirty="0"/>
+          </a:p>
+        </p:txBody>
+      </p:sp>
+    </p:spTree>
+    <p:extLst>
+      <p:ext uri="{BB962C8B-B14F-4D97-AF65-F5344CB8AC3E}">
+        <p14:creationId xmlns:p14="http://schemas.microsoft.com/office/powerpoint/2010/main" val="2150245254"/>
+      </p:ext>
+    </p:extLst>
+  </p:cSld>
+  <p:clrMapOvr>
+    <a:masterClrMapping/>
+  </p:clrMapOvr>
+</p:sld>
+</file>
+
 <file path=ppt/theme/theme1.xml><?xml version="1.0" encoding="utf-8"?>
 <a:theme xmlns:a="http://schemas.openxmlformats.org/drawingml/2006/main" name="Office Theme">
   <a:themeElements>

</xml_diff>